<commit_message>
update python code and power point
</commit_message>
<xml_diff>
--- a/Fuzzy C-means.pptx
+++ b/Fuzzy C-means.pptx
@@ -242,7 +242,7 @@
                 <a:cs typeface="Tahoma" panose="020B0604030504040204" pitchFamily="34" charset="0"/>
               </a:rPr>
               <a:pPr algn="l" rtl="1"/>
-              <a:t>כ"ז/טבת/תשע"ט</a:t>
+              <a:t>ה'/שבט/תשע"ט</a:t>
             </a:fld>
             <a:endParaRPr lang="he-IL" dirty="0">
               <a:latin typeface="Tahoma" panose="020B0604030504040204" pitchFamily="34" charset="0"/>
@@ -436,7 +436,7 @@
             <a:fld id="{562B8339-3B95-43C6-B7D6-5435D4E5A90A}" type="datetime1">
               <a:rPr lang="he-IL" smtClean="0"/>
               <a:pPr/>
-              <a:t>כ"ז/טבת/תשע"ט</a:t>
+              <a:t>ה'/שבט/תשע"ט</a:t>
             </a:fld>
             <a:endParaRPr lang="he-IL" dirty="0"/>
           </a:p>
@@ -1126,7 +1126,7 @@
           <a:p>
             <a:fld id="{48A87A34-81AB-432B-8DAE-1953F412C126}" type="datetimeFigureOut">
               <a:rPr lang="en-US" smtClean="0"/>
-              <a:t>1/4/2019</a:t>
+              <a:t>1/11/2019</a:t>
             </a:fld>
             <a:endParaRPr lang="en-US" dirty="0"/>
           </a:p>
@@ -1350,7 +1350,7 @@
             <a:fld id="{02AF34A9-CFF1-4D0E-8EB5-EB7533D66B1C}" type="datetime1">
               <a:rPr lang="he-IL" smtClean="0"/>
               <a:pPr/>
-              <a:t>כ"ז/טבת/תשע"ט</a:t>
+              <a:t>ה'/שבט/תשע"ט</a:t>
             </a:fld>
             <a:endParaRPr lang="he-IL" dirty="0"/>
           </a:p>
@@ -1584,7 +1584,7 @@
             <a:fld id="{BD38EF16-95A9-428F-96E9-DDF84DDF1B9A}" type="datetime1">
               <a:rPr lang="he-IL" smtClean="0"/>
               <a:pPr/>
-              <a:t>כ"ז/טבת/תשע"ט</a:t>
+              <a:t>ה'/שבט/תשע"ט</a:t>
             </a:fld>
             <a:endParaRPr lang="he-IL" dirty="0"/>
           </a:p>
@@ -1804,7 +1804,7 @@
             <a:fld id="{A6F57CCD-C86B-4122-8A0B-204F7F6EB6D5}" type="datetime1">
               <a:rPr lang="he-IL" smtClean="0"/>
               <a:pPr/>
-              <a:t>כ"ז/טבת/תשע"ט</a:t>
+              <a:t>ה'/שבט/תשע"ט</a:t>
             </a:fld>
             <a:endParaRPr lang="he-IL" dirty="0"/>
           </a:p>
@@ -2102,7 +2102,7 @@
             <a:fld id="{7BC09E54-0280-4A7C-AA55-CD8AC6C3427E}" type="datetime1">
               <a:rPr lang="he-IL" smtClean="0"/>
               <a:pPr/>
-              <a:t>כ"ז/טבת/תשע"ט</a:t>
+              <a:t>ה'/שבט/תשע"ט</a:t>
             </a:fld>
             <a:endParaRPr lang="he-IL" dirty="0"/>
           </a:p>
@@ -2389,7 +2389,7 @@
             <a:fld id="{06875287-8F79-49E6-8057-F267818EC73F}" type="datetime1">
               <a:rPr lang="he-IL" noProof="0" smtClean="0"/>
               <a:pPr/>
-              <a:t>כ"ז/טבת/תשע"ט</a:t>
+              <a:t>ה'/שבט/תשע"ט</a:t>
             </a:fld>
             <a:endParaRPr lang="he-IL" noProof="0" dirty="0"/>
           </a:p>
@@ -2824,7 +2824,7 @@
             <a:fld id="{62E5F1E3-A47F-48FC-B259-A90ABC415919}" type="datetime1">
               <a:rPr lang="he-IL" noProof="0" smtClean="0"/>
               <a:pPr/>
-              <a:t>כ"ז/טבת/תשע"ט</a:t>
+              <a:t>ה'/שבט/תשע"ט</a:t>
             </a:fld>
             <a:endParaRPr lang="he-IL" noProof="0" dirty="0"/>
           </a:p>
@@ -2992,7 +2992,7 @@
             <a:fld id="{ED6A1F81-8988-4DE0-875F-D722C92A7DA9}" type="datetime1">
               <a:rPr lang="he-IL" noProof="0" smtClean="0"/>
               <a:pPr/>
-              <a:t>כ"ז/טבת/תשע"ט</a:t>
+              <a:t>ה'/שבט/תשע"ט</a:t>
             </a:fld>
             <a:endParaRPr lang="he-IL" noProof="0" dirty="0"/>
           </a:p>
@@ -3137,7 +3137,7 @@
             <a:fld id="{5FA0B39D-AB77-4634-88E6-990EF5258CA8}" type="datetime1">
               <a:rPr lang="he-IL" noProof="0" smtClean="0"/>
               <a:pPr/>
-              <a:t>כ"ז/טבת/תשע"ט</a:t>
+              <a:t>ה'/שבט/תשע"ט</a:t>
             </a:fld>
             <a:endParaRPr lang="he-IL" noProof="0" dirty="0"/>
           </a:p>
@@ -3407,7 +3407,7 @@
             <a:fld id="{B639D642-F73F-43A2-9430-3CE3E101BB95}" type="datetime1">
               <a:rPr lang="he-IL" noProof="0" smtClean="0"/>
               <a:pPr/>
-              <a:t>כ"ז/טבת/תשע"ט</a:t>
+              <a:t>ה'/שבט/תשע"ט</a:t>
             </a:fld>
             <a:endParaRPr lang="he-IL" noProof="0" dirty="0"/>
           </a:p>
@@ -3923,7 +3923,7 @@
             <a:fld id="{48A87A34-81AB-432B-8DAE-1953F412C126}" type="datetimeFigureOut">
               <a:rPr lang="en-US" smtClean="0"/>
               <a:pPr/>
-              <a:t>1/4/2019</a:t>
+              <a:t>1/11/2019</a:t>
             </a:fld>
             <a:endParaRPr lang="en-US" dirty="0"/>
           </a:p>
@@ -4262,7 +4262,7 @@
             <a:fld id="{7328A23D-74BB-42D6-BD6D-9E39511D23AF}" type="datetime1">
               <a:rPr lang="he-IL" noProof="0" smtClean="0"/>
               <a:pPr/>
-              <a:t>כ"ז/טבת/תשע"ט</a:t>
+              <a:t>ה'/שבט/תשע"ט</a:t>
             </a:fld>
             <a:endParaRPr lang="he-IL" noProof="0" dirty="0"/>
           </a:p>
@@ -4973,7 +4973,7 @@
         </p:spPr>
         <p:txBody>
           <a:bodyPr>
-            <a:normAutofit fontScale="47500" lnSpcReduction="20000"/>
+            <a:normAutofit fontScale="55000" lnSpcReduction="20000"/>
           </a:bodyPr>
           <a:lstStyle/>
           <a:p>
@@ -4981,8 +4981,8 @@
               <a:buNone/>
             </a:pPr>
             <a:r>
-              <a:rPr lang="he-IL" sz="3300" dirty="0"/>
-              <a:t>קלט - ([[1, 1, 1], [1, 2, 2], [2, 2, 3], [9, 10, 11], [10, 10, 10], [10, 9, 9], [9, 9, 9], [20, 20, 20]])</a:t>
+              <a:rPr lang="he-IL" sz="3600" dirty="0"/>
+              <a:t>קלט - [1, 1], [1, 2], [2, 2], [9, 10], [10, 10], [10, 9], [9, 9], [20,20]</a:t>
             </a:r>
           </a:p>
           <a:p>
@@ -4999,8 +4999,16 @@
               <a:buNone/>
             </a:pPr>
             <a:r>
+              <a:rPr lang="he-IL" sz="3300" b="0" dirty="0"/>
+              <a:t>זמן </a:t>
+            </a:r>
+            <a:r>
               <a:rPr lang="he-IL" sz="3300" dirty="0"/>
-              <a:t>מספר איטרציות עד להתכנסות – 17</a:t>
+              <a:t>ריצה בשניות - </a:t>
+            </a:r>
+            <a:r>
+              <a:rPr lang="en-US" sz="3300" dirty="0"/>
+              <a:t>0.025295734405517578</a:t>
             </a:r>
           </a:p>
           <a:p>
@@ -5008,18 +5016,9 @@
               <a:buNone/>
             </a:pPr>
             <a:r>
-              <a:rPr lang="he-IL" sz="3300" b="0" dirty="0"/>
-              <a:t>זמן </a:t>
-            </a:r>
-            <a:r>
-              <a:rPr lang="he-IL" sz="3300" dirty="0"/>
-              <a:t>ריצה בשניות - </a:t>
-            </a:r>
-            <a:r>
-              <a:rPr lang="en-US" sz="3300" dirty="0"/>
-              <a:t>34.81451749801636 seconds </a:t>
-            </a:r>
-            <a:endParaRPr lang="he-IL" sz="3300" dirty="0"/>
+              <a:rPr lang="he-IL" dirty="0"/>
+              <a:t>מטריצת תוצאה –</a:t>
+            </a:r>
           </a:p>
           <a:p>
             <a:pPr marL="0" indent="0" algn="r" rtl="1">
@@ -5027,7 +5026,7 @@
             </a:pPr>
             <a:r>
               <a:rPr lang="he-IL" dirty="0"/>
-              <a:t>מטריצת תוצאה – </a:t>
+              <a:t> [[0.26518983 0.21671796 0.51809221]</a:t>
             </a:r>
           </a:p>
           <a:p>
@@ -5035,8 +5034,8 @@
               <a:buNone/>
             </a:pPr>
             <a:r>
-              <a:rPr lang="en-US" dirty="0"/>
-              <a:t>[[1.42179405e-03 9.91611909e-01 6.96629679e-03]</a:t>
+              <a:rPr lang="he-IL" dirty="0"/>
+              <a:t> [0.23204367 0.18809365 0.57986267]</a:t>
             </a:r>
           </a:p>
           <a:p>
@@ -5044,8 +5043,8 @@
               <a:buNone/>
             </a:pPr>
             <a:r>
-              <a:rPr lang="en-US" dirty="0"/>
-              <a:t> [2.17445013e-04 9.98618894e-01 1.16366069e-03]</a:t>
+              <a:rPr lang="he-IL" dirty="0"/>
+              <a:t> [0.27043039 0.21708525 0.51248436]</a:t>
             </a:r>
           </a:p>
           <a:p>
@@ -5053,8 +5052,8 @@
               <a:buNone/>
             </a:pPr>
             <a:r>
-              <a:rPr lang="en-US" dirty="0"/>
-              <a:t> [1.64706050e-03 9.88588063e-01 9.76487627e-03]</a:t>
+              <a:rPr lang="he-IL" dirty="0"/>
+              <a:t> [0.50824606 0.23749445 0.25425949]</a:t>
             </a:r>
           </a:p>
           <a:p>
@@ -5062,8 +5061,8 @@
               <a:buNone/>
             </a:pPr>
             <a:r>
-              <a:rPr lang="en-US" dirty="0"/>
-              <a:t> [6.76556500e-03 9.76222778e-03 9.83472207e-01]</a:t>
+              <a:rPr lang="he-IL" dirty="0"/>
+              <a:t> [0.50567139 0.24215958 0.25216902]</a:t>
             </a:r>
           </a:p>
           <a:p>
@@ -5071,8 +5070,8 @@
               <a:buNone/>
             </a:pPr>
             <a:r>
-              <a:rPr lang="en-US" dirty="0"/>
-              <a:t> [1.86787581e-03 2.68589455e-03 9.95446230e-01]</a:t>
+              <a:rPr lang="he-IL" dirty="0"/>
+              <a:t> [0.50851631 0.23750471 0.25397897]</a:t>
             </a:r>
           </a:p>
           <a:p>
@@ -5080,8 +5079,8 @@
               <a:buNone/>
             </a:pPr>
             <a:r>
-              <a:rPr lang="en-US" dirty="0"/>
-              <a:t> [3.04957495e-03 5.86067262e-03 9.91089752e-01]</a:t>
+              <a:rPr lang="he-IL" dirty="0"/>
+              <a:t> [0.51099027 0.23282833 0.2561814 ]</a:t>
             </a:r>
           </a:p>
           <a:p>
@@ -5089,19 +5088,9 @@
               <a:buNone/>
             </a:pPr>
             <a:r>
-              <a:rPr lang="en-US" dirty="0"/>
-              <a:t> [2.88734479e-03 6.48512387e-03 9.90627531e-01]</a:t>
-            </a:r>
-          </a:p>
-          <a:p>
-            <a:pPr marL="0" indent="0" algn="r" rtl="1">
-              <a:buNone/>
-            </a:pPr>
-            <a:r>
-              <a:rPr lang="en-US" dirty="0"/>
-              <a:t> [9.99999993e-01 1.77010970e-09 5.48327847e-09]]</a:t>
-            </a:r>
-            <a:endParaRPr lang="he-IL" b="0" dirty="0"/>
+              <a:rPr lang="he-IL" dirty="0"/>
+              <a:t> [0.07337934 0.86289132 0.06372934]]</a:t>
+            </a:r>
           </a:p>
         </p:txBody>
       </p:sp>
@@ -5204,30 +5193,6 @@
           <a:chExt cx="0" cy="0"/>
         </a:xfrm>
       </p:grpSpPr>
-      <p:pic>
-        <p:nvPicPr>
-          <p:cNvPr id="6" name="תמונה 5"/>
-          <p:cNvPicPr>
-            <a:picLocks noChangeAspect="1"/>
-          </p:cNvPicPr>
-          <p:nvPr/>
-        </p:nvPicPr>
-        <p:blipFill>
-          <a:blip r:embed="rId2"/>
-          <a:stretch>
-            <a:fillRect/>
-          </a:stretch>
-        </p:blipFill>
-        <p:spPr>
-          <a:xfrm>
-            <a:off x="1451579" y="2110332"/>
-            <a:ext cx="2995703" cy="3703022"/>
-          </a:xfrm>
-          <a:prstGeom prst="rect">
-            <a:avLst/>
-          </a:prstGeom>
-        </p:spPr>
-      </p:pic>
       <p:sp>
         <p:nvSpPr>
           <p:cNvPr id="7" name="כותרת 1">
@@ -5265,7 +5230,31 @@
       </p:sp>
       <p:pic>
         <p:nvPicPr>
-          <p:cNvPr id="8" name="תמונה 7"/>
+          <p:cNvPr id="4" name="תמונה 3"/>
+          <p:cNvPicPr>
+            <a:picLocks noChangeAspect="1"/>
+          </p:cNvPicPr>
+          <p:nvPr/>
+        </p:nvPicPr>
+        <p:blipFill>
+          <a:blip r:embed="rId2"/>
+          <a:stretch>
+            <a:fillRect/>
+          </a:stretch>
+        </p:blipFill>
+        <p:spPr>
+          <a:xfrm>
+            <a:off x="937773" y="185874"/>
+            <a:ext cx="3114543" cy="5779498"/>
+          </a:xfrm>
+          <a:prstGeom prst="rect">
+            <a:avLst/>
+          </a:prstGeom>
+        </p:spPr>
+      </p:pic>
+      <p:pic>
+        <p:nvPicPr>
+          <p:cNvPr id="5" name="תמונה 4"/>
           <p:cNvPicPr>
             <a:picLocks noChangeAspect="1"/>
           </p:cNvPicPr>
@@ -5279,8 +5268,8 @@
         </p:blipFill>
         <p:spPr>
           <a:xfrm>
-            <a:off x="5147357" y="2110332"/>
-            <a:ext cx="5907497" cy="3703022"/>
+            <a:off x="4860470" y="2265436"/>
+            <a:ext cx="5972991" cy="3699936"/>
           </a:xfrm>
           <a:prstGeom prst="rect">
             <a:avLst/>
@@ -5353,7 +5342,7 @@
         </p:spPr>
         <p:txBody>
           <a:bodyPr>
-            <a:normAutofit fontScale="40000" lnSpcReduction="20000"/>
+            <a:normAutofit fontScale="47500" lnSpcReduction="20000"/>
           </a:bodyPr>
           <a:lstStyle/>
           <a:p>
@@ -5362,7 +5351,7 @@
             </a:pPr>
             <a:r>
               <a:rPr lang="he-IL" sz="5000" dirty="0"/>
-              <a:t>קלט - ([[1, 1, 1], [1, 2, 2], [2, 2, 3], [9, 10, 11], [10, 10, 10], [10, 9, 9], [9, 9, 9], [20, 20, 20]])</a:t>
+              <a:t>קלט - [1, 1], [1, 2], [2, 2], [9, 10], [10, 10], [10, 9], [9, 9], [20,20]</a:t>
             </a:r>
           </a:p>
           <a:p>
@@ -5371,7 +5360,7 @@
             </a:pPr>
             <a:r>
               <a:rPr lang="he-IL" sz="5000" b="0" dirty="0"/>
-              <a:t>מספר אשכולות – 10</a:t>
+              <a:t>מספר אשכולות – 5</a:t>
             </a:r>
           </a:p>
           <a:p>
@@ -5379,25 +5368,26 @@
               <a:buNone/>
             </a:pPr>
             <a:r>
+              <a:rPr lang="he-IL" sz="5000" b="0" dirty="0"/>
+              <a:t>זמן </a:t>
+            </a:r>
+            <a:r>
               <a:rPr lang="he-IL" sz="5000" dirty="0"/>
-              <a:t>מספר איטרציות עד להתכנסות – 14</a:t>
-            </a:r>
+              <a:t>ריצה בשניות - </a:t>
+            </a:r>
+            <a:r>
+              <a:rPr lang="en-US" sz="5000" dirty="0"/>
+              <a:t>0.055551767349243164 seconds </a:t>
+            </a:r>
+            <a:endParaRPr lang="he-IL" sz="5000" dirty="0"/>
           </a:p>
           <a:p>
             <a:pPr marL="0" indent="0" algn="r" rtl="1">
               <a:buNone/>
             </a:pPr>
             <a:r>
-              <a:rPr lang="he-IL" sz="5000" b="0" dirty="0"/>
-              <a:t>זמן </a:t>
-            </a:r>
-            <a:r>
-              <a:rPr lang="he-IL" sz="5000" dirty="0"/>
-              <a:t>ריצה בשניות - </a:t>
-            </a:r>
-            <a:r>
-              <a:rPr lang="en-US" sz="5000" dirty="0"/>
-              <a:t>33.47169756889343 seconds</a:t>
+              <a:rPr lang="he-IL" dirty="0"/>
+              <a:t>מטריצת תוצאה – </a:t>
             </a:r>
           </a:p>
           <a:p>
@@ -5405,8 +5395,8 @@
               <a:buNone/>
             </a:pPr>
             <a:r>
-              <a:rPr lang="he-IL" dirty="0"/>
-              <a:t>מטריצת תוצאה – </a:t>
+              <a:rPr lang="en-US" dirty="0"/>
+              <a:t>[[0.15892178 0.15431111 0.12801724 0.26727652 0.29147334]</a:t>
             </a:r>
           </a:p>
           <a:p>
@@ -5415,7 +5405,7 @@
             </a:pPr>
             <a:r>
               <a:rPr lang="en-US" dirty="0"/>
-              <a:t>[[4.78460834e-08 4.99991571e-06 4.11515696e-08 4.99991571e-06 9.23345469e-09 1.66663857e-06 5.20824553e-08 4.99991571e-06 9.99990000e-01 4.08156385e-08]</a:t>
+              <a:t> [0.04597122 0.04456069 0.03669953 0.08300912 0.78975944]</a:t>
             </a:r>
           </a:p>
           <a:p>
@@ -5424,7 +5414,7 @@
             </a:pPr>
             <a:r>
               <a:rPr lang="en-US" dirty="0"/>
-              <a:t> [1.86219105e-08 9.99990000e-01 1.59489090e-08 9.99990000e-01 3.30358967e-09 1.66666099e-06 2.05760616e-08 9.99990000e-01 1.66666099e-06 1.59489090e-08]</a:t>
+              <a:t> [0.03927019 0.03798107 0.03101133 0.8220799  0.06965751]</a:t>
             </a:r>
           </a:p>
           <a:p>
@@ -5433,7 +5423,7 @@
             </a:pPr>
             <a:r>
               <a:rPr lang="en-US" dirty="0"/>
-              <a:t> [6.71129576e-08 4.99991534e-06 5.64962185e-08 4.99991534e-06 1.06721779e-08 9.99990000e-01 7.46256021e-08 4.99991534e-06 1.66663845e-06 5.64962185e-08]</a:t>
+              <a:t> [0.27713757 0.27713837 0.14113634 0.15348027 0.15110744]</a:t>
             </a:r>
           </a:p>
           <a:p>
@@ -5442,7 +5432,7 @@
             </a:pPr>
             <a:r>
               <a:rPr lang="en-US" dirty="0"/>
-              <a:t> [1.66665177e-06 4.78464622e-08 4.99995530e-06 4.78464622e-08 3.31122867e-08 5.64966700e-08 1.99998212e-06 4.78464622e-08 4.08159616e-08 9.99990000e-01]</a:t>
+              <a:t> [0.07526878 0.79358893 0.04232601 0.04475426 0.04406202]</a:t>
             </a:r>
           </a:p>
           <a:p>
@@ -5451,7 +5441,7 @@
             </a:pPr>
             <a:r>
               <a:rPr lang="en-US" dirty="0"/>
-              <a:t> [4.99993196e-06 4.78462389e-08 9.99990000e-01 4.78462389e-08 3.33328797e-08 5.64964063e-08 3.33328797e-06 4.78462389e-08 4.11517034e-08 4.99993196e-06]</a:t>
+              <a:t> [0.27721867 0.27721947 0.14117764 0.15352518 0.15085904]</a:t>
             </a:r>
           </a:p>
           <a:p>
@@ -5460,7 +5450,7 @@
             </a:pPr>
             <a:r>
               <a:rPr lang="en-US" dirty="0"/>
-              <a:t> [9.99990000e-01 5.58649733e-08 4.99991511e-06 5.58649733e-08 2.92392696e-08 6.71129545e-08 9.99983022e-06 5.58649733e-08 4.78460776e-08 1.66663837e-06]</a:t>
+              <a:t> [0.79833834 0.07286014 0.04000673 0.04479259 0.0440022 ]</a:t>
             </a:r>
           </a:p>
           <a:p>
@@ -5469,16 +5459,7 @@
             </a:pPr>
             <a:r>
               <a:rPr lang="en-US" dirty="0"/>
-              <a:t> [9.99984327e-06 6.17274276e-08 3.33328109e-06 6.17274276e-08 2.75477776e-08 7.46256961e-08 9.99990000e-01 6.17274276e-08 5.20825171e-08 1.99996865e-06]</a:t>
-            </a:r>
-          </a:p>
-          <a:p>
-            <a:pPr marL="0" indent="0" algn="r" rtl="1">
-              <a:buNone/>
-            </a:pPr>
-            <a:r>
-              <a:rPr lang="en-US" dirty="0"/>
-              <a:t> [2.92397610e-08 9.91080106e-09 3.33333276e-08 9.91080106e-09 9.99990000e-01 1.06723567e-08 2.75482046e-08 9.91080106e-09 9.23360875e-09 3.31125771e-08]]</a:t>
+              <a:t> [0.01688587 0.01729299 0.93606491 0.01492975 0.01482648]]</a:t>
             </a:r>
             <a:endParaRPr lang="he-IL" b="0" dirty="0"/>
           </a:p>
@@ -5537,7 +5518,7 @@
             <a:pPr algn="r" rtl="1"/>
             <a:r>
               <a:rPr lang="he-IL" dirty="0"/>
-              <a:t>10 אשכולות</a:t>
+              <a:t>5 אשכולות</a:t>
             </a:r>
             <a:endParaRPr lang="en-001" dirty="0"/>
           </a:p>
@@ -5585,54 +5566,6 @@
           <a:chExt cx="0" cy="0"/>
         </a:xfrm>
       </p:grpSpPr>
-      <p:pic>
-        <p:nvPicPr>
-          <p:cNvPr id="4" name="תמונה 3"/>
-          <p:cNvPicPr>
-            <a:picLocks noChangeAspect="1"/>
-          </p:cNvPicPr>
-          <p:nvPr/>
-        </p:nvPicPr>
-        <p:blipFill>
-          <a:blip r:embed="rId2"/>
-          <a:stretch>
-            <a:fillRect/>
-          </a:stretch>
-        </p:blipFill>
-        <p:spPr>
-          <a:xfrm>
-            <a:off x="393927" y="1884452"/>
-            <a:ext cx="5310188" cy="4162432"/>
-          </a:xfrm>
-          <a:prstGeom prst="rect">
-            <a:avLst/>
-          </a:prstGeom>
-        </p:spPr>
-      </p:pic>
-      <p:pic>
-        <p:nvPicPr>
-          <p:cNvPr id="5" name="תמונה 4"/>
-          <p:cNvPicPr>
-            <a:picLocks noChangeAspect="1"/>
-          </p:cNvPicPr>
-          <p:nvPr/>
-        </p:nvPicPr>
-        <p:blipFill>
-          <a:blip r:embed="rId3"/>
-          <a:stretch>
-            <a:fillRect/>
-          </a:stretch>
-        </p:blipFill>
-        <p:spPr>
-          <a:xfrm>
-            <a:off x="5913120" y="757645"/>
-            <a:ext cx="5633320" cy="5289239"/>
-          </a:xfrm>
-          <a:prstGeom prst="rect">
-            <a:avLst/>
-          </a:prstGeom>
-        </p:spPr>
-      </p:pic>
       <p:sp>
         <p:nvSpPr>
           <p:cNvPr id="6" name="כותרת 1">
@@ -5668,6 +5601,54 @@
           </a:p>
         </p:txBody>
       </p:sp>
+      <p:pic>
+        <p:nvPicPr>
+          <p:cNvPr id="4" name="תמונה 3"/>
+          <p:cNvPicPr>
+            <a:picLocks noChangeAspect="1"/>
+          </p:cNvPicPr>
+          <p:nvPr/>
+        </p:nvPicPr>
+        <p:blipFill>
+          <a:blip r:embed="rId2"/>
+          <a:stretch>
+            <a:fillRect/>
+          </a:stretch>
+        </p:blipFill>
+        <p:spPr>
+          <a:xfrm>
+            <a:off x="8074121" y="180975"/>
+            <a:ext cx="3976500" cy="5868477"/>
+          </a:xfrm>
+          <a:prstGeom prst="rect">
+            <a:avLst/>
+          </a:prstGeom>
+        </p:spPr>
+      </p:pic>
+      <p:pic>
+        <p:nvPicPr>
+          <p:cNvPr id="7" name="תמונה 6"/>
+          <p:cNvPicPr>
+            <a:picLocks noChangeAspect="1"/>
+          </p:cNvPicPr>
+          <p:nvPr/>
+        </p:nvPicPr>
+        <p:blipFill>
+          <a:blip r:embed="rId3"/>
+          <a:stretch>
+            <a:fillRect/>
+          </a:stretch>
+        </p:blipFill>
+        <p:spPr>
+          <a:xfrm>
+            <a:off x="339769" y="2256751"/>
+            <a:ext cx="7400747" cy="2986496"/>
+          </a:xfrm>
+          <a:prstGeom prst="rect">
+            <a:avLst/>
+          </a:prstGeom>
+        </p:spPr>
+      </p:pic>
     </p:spTree>
     <p:extLst>
       <p:ext uri="{BB962C8B-B14F-4D97-AF65-F5344CB8AC3E}">
@@ -5734,7 +5715,7 @@
         </p:spPr>
         <p:txBody>
           <a:bodyPr>
-            <a:normAutofit fontScale="40000" lnSpcReduction="20000"/>
+            <a:normAutofit fontScale="47500" lnSpcReduction="20000"/>
           </a:bodyPr>
           <a:lstStyle/>
           <a:p>
@@ -5742,8 +5723,8 @@
               <a:buNone/>
             </a:pPr>
             <a:r>
-              <a:rPr lang="he-IL" sz="4500" dirty="0"/>
-              <a:t>קלט - ([[1, 1, 1], [1, 2, 2], [2, 2, 3], [9, 10, 11], [10, 10, 10], [10, 9, 9], [9, 9, 9], [20, 20, 20]])</a:t>
+              <a:rPr lang="he-IL" sz="4800" dirty="0"/>
+              <a:t>קלט - [1, 1], [1, 2], [2, 2], [9, 10], [10, 10], [10, 9], [9, 9], [20,20]</a:t>
             </a:r>
           </a:p>
           <a:p>
@@ -5752,7 +5733,7 @@
             </a:pPr>
             <a:r>
               <a:rPr lang="he-IL" sz="4500" b="0" dirty="0"/>
-              <a:t>מספר אשכולות – 15</a:t>
+              <a:t>מספר אשכולות – 8</a:t>
             </a:r>
           </a:p>
           <a:p>
@@ -5760,8 +5741,16 @@
               <a:buNone/>
             </a:pPr>
             <a:r>
+              <a:rPr lang="he-IL" sz="4500" b="0" dirty="0"/>
+              <a:t>זמן </a:t>
+            </a:r>
+            <a:r>
               <a:rPr lang="he-IL" sz="4500" dirty="0"/>
-              <a:t>מספר איטרציות עד להתכנסות – 7</a:t>
+              <a:t>ריצה בשניות - </a:t>
+            </a:r>
+            <a:r>
+              <a:rPr lang="en-US" sz="4500" dirty="0"/>
+              <a:t>0.10515332221984863 seconds </a:t>
             </a:r>
           </a:p>
           <a:p>
@@ -5769,16 +5758,8 @@
               <a:buNone/>
             </a:pPr>
             <a:r>
-              <a:rPr lang="he-IL" sz="4500" b="0" dirty="0"/>
-              <a:t>זמן </a:t>
-            </a:r>
-            <a:r>
-              <a:rPr lang="he-IL" sz="4500" dirty="0"/>
-              <a:t>ריצה בשניות - </a:t>
-            </a:r>
-            <a:r>
-              <a:rPr lang="en-US" sz="4500" dirty="0"/>
-              <a:t>40.1422700881958</a:t>
+              <a:rPr lang="he-IL" dirty="0"/>
+              <a:t>מטריצת תוצאה – </a:t>
             </a:r>
           </a:p>
           <a:p>
@@ -5786,8 +5767,8 @@
               <a:buNone/>
             </a:pPr>
             <a:r>
-              <a:rPr lang="he-IL" dirty="0"/>
-              <a:t>מטריצת תוצאה – </a:t>
+              <a:rPr lang="en-US" dirty="0"/>
+              <a:t>[[0.07674011 0.09474491 0.20457988 0.17927234 0.1638777  0.09400229 0.09277909 0.0940037 ]</a:t>
             </a:r>
           </a:p>
           <a:p>
@@ -5796,31 +5777,7 @@
             </a:pPr>
             <a:r>
               <a:rPr lang="en-US" dirty="0"/>
-              <a:t>[[5.55550891e-07 1.66665267e-06 5.55550891e-07 1.59488294e-08 1.66665267e-06 </a:t>
-            </a:r>
-            <a:r>
-              <a:rPr lang="en-US" dirty="0" err="1"/>
-              <a:t>1.66665267e-06</a:t>
-            </a:r>
-            <a:r>
-              <a:rPr lang="en-US" dirty="0"/>
-              <a:t> </a:t>
-            </a:r>
-            <a:r>
-              <a:rPr lang="en-US" dirty="0" err="1"/>
-              <a:t>1.66665267e-06</a:t>
-            </a:r>
-            <a:r>
-              <a:rPr lang="en-US" dirty="0"/>
-              <a:t> 1.37173059e-08 9.99990000e-01 </a:t>
-            </a:r>
-            <a:r>
-              <a:rPr lang="en-US" dirty="0" err="1"/>
-              <a:t>9.99990000e-01</a:t>
-            </a:r>
-            <a:r>
-              <a:rPr lang="en-US" dirty="0"/>
-              <a:t> 1.36053279e-08 1.73609653e-08 9.99990000e-01 3.07784427e-09 5.55550891e-07]</a:t>
+              <a:t> [0.06725217 0.0837538  0.18151855 0.26265695 0.15678507 0.08303006 0.081916   0.0830874 ]</a:t>
             </a:r>
           </a:p>
           <a:p>
@@ -5829,31 +5786,7 @@
             </a:pPr>
             <a:r>
               <a:rPr lang="en-US" dirty="0"/>
-              <a:t> [1.24999056e-06 9.99990000e-01 1.24999056e-06 1.39663749e-08 9.99990000e-01 </a:t>
-            </a:r>
-            <a:r>
-              <a:rPr lang="en-US" dirty="0" err="1"/>
-              <a:t>9.99990000e-01</a:t>
-            </a:r>
-            <a:r>
-              <a:rPr lang="en-US" dirty="0"/>
-              <a:t> </a:t>
-            </a:r>
-            <a:r>
-              <a:rPr lang="en-US" dirty="0" err="1"/>
-              <a:t>9.99990000e-01</a:t>
-            </a:r>
-            <a:r>
-              <a:rPr lang="en-US" dirty="0"/>
-              <a:t> 1.19616321e-08 1.24999056e-06 </a:t>
-            </a:r>
-            <a:r>
-              <a:rPr lang="en-US" dirty="0" err="1"/>
-              <a:t>1.24999056e-06</a:t>
-            </a:r>
-            <a:r>
-              <a:rPr lang="en-US" dirty="0"/>
-              <a:t> 1.19616321e-08 1.54319822e-08 1.24999056e-06 2.47768197e-09 1.24999056e-06]</a:t>
+              <a:t> [0.07021879 0.08836462 0.15737968 0.15965902 0.26293209 0.08757696 0.0862904  0.08757845]</a:t>
             </a:r>
           </a:p>
           <a:p>
@@ -5862,31 +5795,7 @@
             </a:pPr>
             <a:r>
               <a:rPr lang="en-US" dirty="0"/>
-              <a:t> [1.00000000e+00 6.27220791e-24 9.99990000e-01 8.41907102e-26 6.27220791e-24 </a:t>
-            </a:r>
-            <a:r>
-              <a:rPr lang="en-US" dirty="0" err="1"/>
-              <a:t>6.27220791e-24</a:t>
-            </a:r>
-            <a:r>
-              <a:rPr lang="en-US" dirty="0"/>
-              <a:t> </a:t>
-            </a:r>
-            <a:r>
-              <a:rPr lang="en-US" dirty="0" err="1"/>
-              <a:t>6.27220791e-24</a:t>
-            </a:r>
-            <a:r>
-              <a:rPr lang="en-US" dirty="0"/>
-              <a:t> 7.08724058e-26 2.09073597e-24 </a:t>
-            </a:r>
-            <a:r>
-              <a:rPr lang="en-US" dirty="0" err="1"/>
-              <a:t>2.09073597e-24</a:t>
-            </a:r>
-            <a:r>
-              <a:rPr lang="en-US" dirty="0"/>
-              <a:t> 7.08724058e-26 9.36150435e-26 2.09073597e-24 1.33878504e-26 9.99990000e-01]</a:t>
+              <a:t> [0.07911708 0.16220977 0.08421363 0.08464429 0.08579588 0.15725806 0.15952949 0.18723181]</a:t>
             </a:r>
           </a:p>
           <a:p>
@@ -5895,31 +5804,7 @@
             </a:pPr>
             <a:r>
               <a:rPr lang="en-US" dirty="0"/>
-              <a:t> [5.64966563e-08 4.78464506e-08 5.64966563e-08 1.66665136e-06 4.78464506e-08 </a:t>
-            </a:r>
-            <a:r>
-              <a:rPr lang="en-US" dirty="0" err="1"/>
-              <a:t>4.78464506e-08</a:t>
-            </a:r>
-            <a:r>
-              <a:rPr lang="en-US" dirty="0"/>
-              <a:t> </a:t>
-            </a:r>
-            <a:r>
-              <a:rPr lang="en-US" dirty="0" err="1"/>
-              <a:t>4.78464506e-08</a:t>
-            </a:r>
-            <a:r>
-              <a:rPr lang="en-US" dirty="0"/>
-              <a:t> 4.99995408e-06 4.08159517e-08 </a:t>
-            </a:r>
-            <a:r>
-              <a:rPr lang="en-US" dirty="0" err="1"/>
-              <a:t>4.08159517e-08</a:t>
-            </a:r>
-            <a:r>
-              <a:rPr lang="en-US" dirty="0"/>
-              <a:t> 9.99990000e-01 1.99998163e-06 4.08159517e-08 3.31122787e-08 5.64966563e-08]</a:t>
+              <a:t> [0.07594483 0.14181168 0.07866701 0.07901552 0.08008529 0.15422329 0.23606785 0.15418454]</a:t>
             </a:r>
           </a:p>
           <a:p>
@@ -5928,31 +5813,7 @@
             </a:pPr>
             <a:r>
               <a:rPr lang="en-US" dirty="0"/>
-              <a:t> [5.64963926e-08 4.78462272e-08 5.64963926e-08 4.99993075e-06 4.78462272e-08 </a:t>
-            </a:r>
-            <a:r>
-              <a:rPr lang="en-US" dirty="0" err="1"/>
-              <a:t>4.78462272e-08</a:t>
-            </a:r>
-            <a:r>
-              <a:rPr lang="en-US" dirty="0"/>
-              <a:t> </a:t>
-            </a:r>
-            <a:r>
-              <a:rPr lang="en-US" dirty="0" err="1"/>
-              <a:t>4.78462272e-08</a:t>
-            </a:r>
-            <a:r>
-              <a:rPr lang="en-US" dirty="0"/>
-              <a:t> 9.99990000e-01 4.11516934e-08 </a:t>
-            </a:r>
-            <a:r>
-              <a:rPr lang="en-US" dirty="0" err="1"/>
-              <a:t>4.11516934e-08</a:t>
-            </a:r>
-            <a:r>
-              <a:rPr lang="en-US" dirty="0"/>
-              <a:t> 4.99993075e-06 3.33328716e-06 4.11516934e-08 3.33328716e-08 5.64963926e-08]</a:t>
+              <a:t> [0.07913904 0.16224393 0.08417329 0.08452942 0.08580892 0.18725009 0.1595764  0.15727891]</a:t>
             </a:r>
           </a:p>
           <a:p>
@@ -5961,31 +5822,7 @@
             </a:pPr>
             <a:r>
               <a:rPr lang="en-US" dirty="0"/>
-              <a:t> [6.71129353e-08 5.58649573e-08 6.71129353e-08 9.99990000e-01 5.58649573e-08 </a:t>
-            </a:r>
-            <a:r>
-              <a:rPr lang="en-US" dirty="0" err="1"/>
-              <a:t>5.58649573e-08</a:t>
-            </a:r>
-            <a:r>
-              <a:rPr lang="en-US" dirty="0"/>
-              <a:t> </a:t>
-            </a:r>
-            <a:r>
-              <a:rPr lang="en-US" dirty="0" err="1"/>
-              <a:t>5.58649573e-08</a:t>
-            </a:r>
-            <a:r>
-              <a:rPr lang="en-US" dirty="0"/>
-              <a:t> 4.99991368e-06 4.78460639e-08 </a:t>
-            </a:r>
-            <a:r>
-              <a:rPr lang="en-US" dirty="0" err="1"/>
-              <a:t>4.78460639e-08</a:t>
-            </a:r>
-            <a:r>
-              <a:rPr lang="en-US" dirty="0"/>
-              <a:t> 1.66663789e-06 9.99982736e-06 4.78460639e-08 2.92392613e-08 6.71129353e-08]</a:t>
+              <a:t> [0.07468589 0.20955477 0.08168767 0.08209426 0.08336286 0.16433053 0.13992255 0.16436148]</a:t>
             </a:r>
           </a:p>
           <a:p>
@@ -5994,64 +5831,7 @@
             </a:pPr>
             <a:r>
               <a:rPr lang="en-US" dirty="0"/>
-              <a:t> [7.46256726e-08 6.17274082e-08 7.46256726e-08 9.99984012e-06 6.17274082e-08 </a:t>
-            </a:r>
-            <a:r>
-              <a:rPr lang="en-US" dirty="0" err="1"/>
-              <a:t>6.17274082e-08</a:t>
-            </a:r>
-            <a:r>
-              <a:rPr lang="en-US" dirty="0"/>
-              <a:t> </a:t>
-            </a:r>
-            <a:r>
-              <a:rPr lang="en-US" dirty="0" err="1"/>
-              <a:t>6.17274082e-08</a:t>
-            </a:r>
-            <a:r>
-              <a:rPr lang="en-US" dirty="0"/>
-              <a:t> 3.33328004e-06 5.20825006e-08 </a:t>
-            </a:r>
-            <a:r>
-              <a:rPr lang="en-US" dirty="0" err="1"/>
-              <a:t>5.20825006e-08</a:t>
-            </a:r>
-            <a:r>
-              <a:rPr lang="en-US" dirty="0"/>
-              <a:t> 1.99996802e-06 9.99990000e-01 5.20825006e-08 2.75477689e-08 7.46256726e-08]</a:t>
-            </a:r>
-          </a:p>
-          <a:p>
-            <a:pPr marL="0" indent="0" algn="r" rtl="1">
-              <a:buNone/>
-            </a:pPr>
-            <a:r>
-              <a:rPr lang="en-US" dirty="0"/>
-              <a:t> [1.06723562e-08 9.91080057e-09 1.06723562e-08 2.92397596e-08 9.91080057e-09 </a:t>
-            </a:r>
-            <a:r>
-              <a:rPr lang="en-US" dirty="0" err="1"/>
-              <a:t>9.91080057e-09</a:t>
-            </a:r>
-            <a:r>
-              <a:rPr lang="en-US" dirty="0"/>
-              <a:t> </a:t>
-            </a:r>
-            <a:r>
-              <a:rPr lang="en-US" dirty="0" err="1"/>
-              <a:t>9.91080057e-09</a:t>
-            </a:r>
-            <a:r>
-              <a:rPr lang="en-US" dirty="0"/>
-              <a:t> 3.33333259e-08 9.23360829e-09 </a:t>
-            </a:r>
-            <a:r>
-              <a:rPr lang="en-US" dirty="0" err="1"/>
-              <a:t>9.23360829e-09</a:t>
-            </a:r>
-            <a:r>
-              <a:rPr lang="en-US" dirty="0"/>
-              <a:t> 3.31125754e-08 2.75482032e-08 9.23360829e-09 9.99990000e-01 1.06723562e-08]]</a:t>
+              <a:t> [0.96372813 0.00544993 0.00475446 0.00476447 0.00479327 0.00548295 0.00554391 0.00548288]]</a:t>
             </a:r>
             <a:endParaRPr lang="he-IL" b="0" dirty="0"/>
           </a:p>
@@ -6110,7 +5890,7 @@
             <a:pPr algn="r" rtl="1"/>
             <a:r>
               <a:rPr lang="he-IL" dirty="0"/>
-              <a:t>15 אשכולות</a:t>
+              <a:t>8 אשכולות</a:t>
             </a:r>
             <a:endParaRPr lang="en-001" dirty="0"/>
           </a:p>
@@ -6195,7 +5975,7 @@
       </p:sp>
       <p:pic>
         <p:nvPicPr>
-          <p:cNvPr id="7" name="תמונה 6"/>
+          <p:cNvPr id="2" name="תמונה 1"/>
           <p:cNvPicPr>
             <a:picLocks noChangeAspect="1"/>
           </p:cNvPicPr>
@@ -6209,8 +5989,8 @@
         </p:blipFill>
         <p:spPr>
           <a:xfrm>
-            <a:off x="525508" y="2409281"/>
-            <a:ext cx="6647121" cy="3486421"/>
+            <a:off x="7177718" y="1375954"/>
+            <a:ext cx="4735608" cy="4433151"/>
           </a:xfrm>
           <a:prstGeom prst="rect">
             <a:avLst/>
@@ -6219,7 +5999,7 @@
       </p:pic>
       <p:pic>
         <p:nvPicPr>
-          <p:cNvPr id="2" name="תמונה 1"/>
+          <p:cNvPr id="5" name="תמונה 4"/>
           <p:cNvPicPr>
             <a:picLocks noChangeAspect="1"/>
           </p:cNvPicPr>
@@ -6233,8 +6013,8 @@
         </p:blipFill>
         <p:spPr>
           <a:xfrm>
-            <a:off x="7255736" y="175691"/>
-            <a:ext cx="4744675" cy="5720011"/>
+            <a:off x="687024" y="1913381"/>
+            <a:ext cx="6219825" cy="3895725"/>
           </a:xfrm>
           <a:prstGeom prst="rect">
             <a:avLst/>
@@ -7568,8 +7348,8 @@
           </a:p>
         </p:txBody>
       </p:sp>
-      <mc:AlternateContent xmlns:mc="http://schemas.openxmlformats.org/markup-compatibility/2006">
-        <mc:Choice xmlns:a14="http://schemas.microsoft.com/office/drawing/2010/main" Requires="a14">
+      <mc:AlternateContent xmlns:mc="http://schemas.openxmlformats.org/markup-compatibility/2006" xmlns:a14="http://schemas.microsoft.com/office/drawing/2010/main">
+        <mc:Choice Requires="a14">
           <p:sp>
             <p:nvSpPr>
               <p:cNvPr id="3" name="מציין מיקום תוכן 2">
@@ -7638,7 +7418,7 @@
                           <a:rPr lang="en-US" b="0" i="1" smtClean="0">
                             <a:latin typeface="Cambria Math" panose="02040503050406030204" pitchFamily="18" charset="0"/>
                           </a:rPr>
-                          <m:t>𝑖</m:t>
+                          <m:t>𝑗</m:t>
                         </m:r>
                       </m:sub>
                     </m:sSub>
@@ -7928,7 +7708,7 @@
             </p:txBody>
           </p:sp>
         </mc:Choice>
-        <mc:Fallback>
+        <mc:Fallback xmlns="">
           <p:sp>
             <p:nvSpPr>
               <p:cNvPr id="3" name="מציין מיקום תוכן 2">
@@ -8991,7 +8771,7 @@
                         </m:sSubPr>
                         <m:e>
                           <m:r>
-                            <a:rPr lang="en-US" i="1" smtClean="0">
+                            <a:rPr lang="en-US" i="1">
                               <a:latin typeface="Cambria Math" panose="02040503050406030204" pitchFamily="18" charset="0"/>
                             </a:rPr>
                             <m:t>𝑐</m:t>
@@ -8999,7 +8779,7 @@
                         </m:e>
                         <m:sub>
                           <m:r>
-                            <a:rPr lang="en-US" i="1" smtClean="0">
+                            <a:rPr lang="en-US" i="1">
                               <a:latin typeface="Cambria Math" panose="02040503050406030204" pitchFamily="18" charset="0"/>
                             </a:rPr>
                             <m:t>𝑗</m:t>
@@ -9040,12 +8820,6 @@
                                   <a:latin typeface="Cambria Math" panose="02040503050406030204" pitchFamily="18" charset="0"/>
                                 </a:rPr>
                                 <m:t>𝑖</m:t>
-                              </m:r>
-                              <m:r>
-                                <a:rPr lang="en-US" b="0" i="1" smtClean="0">
-                                  <a:latin typeface="Cambria Math" panose="02040503050406030204" pitchFamily="18" charset="0"/>
-                                </a:rPr>
-                                <m:t>=</m:t>
                               </m:r>
                               <m:r>
                                 <m:rPr>
@@ -9120,7 +8894,7 @@
                                     <a:rPr lang="en-US" b="0" i="1" smtClean="0">
                                       <a:latin typeface="Cambria Math" panose="02040503050406030204" pitchFamily="18" charset="0"/>
                                     </a:rPr>
-                                    <m:t>𝑖</m:t>
+                                    <m:t>𝑖𝑗</m:t>
                                   </m:r>
                                 </m:sub>
                               </m:sSub>
@@ -9147,12 +8921,6 @@
                                   <a:latin typeface="Cambria Math" panose="02040503050406030204" pitchFamily="18" charset="0"/>
                                 </a:rPr>
                                 <m:t>𝑖</m:t>
-                              </m:r>
-                              <m:r>
-                                <a:rPr lang="en-US" b="0" i="1" smtClean="0">
-                                  <a:latin typeface="Cambria Math" panose="02040503050406030204" pitchFamily="18" charset="0"/>
-                                </a:rPr>
-                                <m:t>=</m:t>
                               </m:r>
                               <m:r>
                                 <m:rPr>
@@ -9216,6 +8984,153 @@
                 <a:endParaRPr lang="he-IL" dirty="0"/>
               </a:p>
               <a:p>
+                <a:pPr marL="0" indent="0" algn="r" rtl="1">
+                  <a:buNone/>
+                </a:pPr>
+                <a:r>
+                  <a:rPr lang="he-IL" dirty="0"/>
+                  <a:t>-  כל תא</a:t>
+                </a:r>
+                <a:r>
+                  <a:rPr lang="en-US" dirty="0"/>
+                  <a:t> </a:t>
+                </a:r>
+                <a14:m>
+                  <m:oMath xmlns:m="http://schemas.openxmlformats.org/officeDocument/2006/math">
+                    <m:sSub>
+                      <m:sSubPr>
+                        <m:ctrlPr>
+                          <a:rPr lang="en-US" i="1">
+                            <a:latin typeface="Cambria Math" panose="02040503050406030204" pitchFamily="18" charset="0"/>
+                          </a:rPr>
+                        </m:ctrlPr>
+                      </m:sSubPr>
+                      <m:e>
+                        <m:r>
+                          <a:rPr lang="en-US" i="1">
+                            <a:latin typeface="Cambria Math" panose="02040503050406030204" pitchFamily="18" charset="0"/>
+                          </a:rPr>
+                          <m:t>𝑤</m:t>
+                        </m:r>
+                      </m:e>
+                      <m:sub>
+                        <m:r>
+                          <a:rPr lang="en-US" i="1">
+                            <a:latin typeface="Cambria Math" panose="02040503050406030204" pitchFamily="18" charset="0"/>
+                          </a:rPr>
+                          <m:t>𝑖</m:t>
+                        </m:r>
+                        <m:r>
+                          <a:rPr lang="en-US" i="1">
+                            <a:latin typeface="Cambria Math" panose="02040503050406030204" pitchFamily="18" charset="0"/>
+                          </a:rPr>
+                          <m:t>,</m:t>
+                        </m:r>
+                        <m:r>
+                          <a:rPr lang="en-US" i="1">
+                            <a:latin typeface="Cambria Math" panose="02040503050406030204" pitchFamily="18" charset="0"/>
+                          </a:rPr>
+                          <m:t>𝑗</m:t>
+                        </m:r>
+                      </m:sub>
+                    </m:sSub>
+                  </m:oMath>
+                </a14:m>
+                <a:r>
+                  <a:rPr lang="en-US" dirty="0"/>
+                  <a:t> </a:t>
+                </a:r>
+                <a:r>
+                  <a:rPr lang="he-IL" dirty="0"/>
+                  <a:t>במטריצה </a:t>
+                </a:r>
+                <a:r>
+                  <a:rPr lang="en-US" dirty="0"/>
+                  <a:t>W</a:t>
+                </a:r>
+                <a:r>
+                  <a:rPr lang="he-IL" dirty="0"/>
+                  <a:t> מציין בכמה אחוז נקודה </a:t>
+                </a:r>
+                <a14:m>
+                  <m:oMath xmlns:m="http://schemas.openxmlformats.org/officeDocument/2006/math">
+                    <m:sSub>
+                      <m:sSubPr>
+                        <m:ctrlPr>
+                          <a:rPr lang="en-US" i="1">
+                            <a:latin typeface="Cambria Math" panose="02040503050406030204" pitchFamily="18" charset="0"/>
+                          </a:rPr>
+                        </m:ctrlPr>
+                      </m:sSubPr>
+                      <m:e>
+                        <m:r>
+                          <a:rPr lang="en-US" i="1">
+                            <a:latin typeface="Cambria Math" panose="02040503050406030204" pitchFamily="18" charset="0"/>
+                          </a:rPr>
+                          <m:t>𝑋</m:t>
+                        </m:r>
+                      </m:e>
+                      <m:sub>
+                        <m:r>
+                          <a:rPr lang="en-US" i="1">
+                            <a:latin typeface="Cambria Math" panose="02040503050406030204" pitchFamily="18" charset="0"/>
+                          </a:rPr>
+                          <m:t>𝑖</m:t>
+                        </m:r>
+                      </m:sub>
+                    </m:sSub>
+                  </m:oMath>
+                </a14:m>
+                <a:r>
+                  <a:rPr lang="he-IL" dirty="0"/>
+                  <a:t> שייכת </a:t>
+                </a:r>
+                <a:r>
+                  <a:rPr lang="he-IL" dirty="0" err="1"/>
+                  <a:t>לקלאסטר</a:t>
+                </a:r>
+                <a:r>
+                  <a:rPr lang="he-IL" dirty="0"/>
+                  <a:t> </a:t>
+                </a:r>
+                <a14:m>
+                  <m:oMath xmlns:m="http://schemas.openxmlformats.org/officeDocument/2006/math">
+                    <m:sSub>
+                      <m:sSubPr>
+                        <m:ctrlPr>
+                          <a:rPr lang="en-US" i="1">
+                            <a:latin typeface="Cambria Math" panose="02040503050406030204" pitchFamily="18" charset="0"/>
+                          </a:rPr>
+                        </m:ctrlPr>
+                      </m:sSubPr>
+                      <m:e>
+                        <m:r>
+                          <a:rPr lang="he-IL" i="1">
+                            <a:latin typeface="Cambria Math" panose="02040503050406030204" pitchFamily="18" charset="0"/>
+                          </a:rPr>
+                          <m:t>.</m:t>
+                        </m:r>
+                        <m:r>
+                          <a:rPr lang="en-US" i="1">
+                            <a:latin typeface="Cambria Math" panose="02040503050406030204" pitchFamily="18" charset="0"/>
+                          </a:rPr>
+                          <m:t>𝑐</m:t>
+                        </m:r>
+                      </m:e>
+                      <m:sub>
+                        <m:r>
+                          <a:rPr lang="en-US" i="1">
+                            <a:latin typeface="Cambria Math" panose="02040503050406030204" pitchFamily="18" charset="0"/>
+                          </a:rPr>
+                          <m:t>𝑗</m:t>
+                        </m:r>
+                      </m:sub>
+                    </m:sSub>
+                  </m:oMath>
+                </a14:m>
+                <a:endParaRPr lang="en-US" dirty="0"/>
+              </a:p>
+              <a:p>
                 <a:pPr algn="r" rtl="1"/>
                 <a:r>
                   <a:rPr lang="he-IL" dirty="0"/>
@@ -9258,7 +9173,7 @@
               <a:blipFill>
                 <a:blip r:embed="rId2"/>
                 <a:stretch>
-                  <a:fillRect r="-635"/>
+                  <a:fillRect r="-698"/>
                 </a:stretch>
               </a:blipFill>
             </p:spPr>
@@ -11643,26 +11558,6 @@
 </file>
 
 <file path=customXml/item1.xml><?xml version="1.0" encoding="utf-8"?>
-<p:properties xmlns:p="http://schemas.microsoft.com/office/2006/metadata/properties" xmlns:xsi="http://www.w3.org/2001/XMLSchema-instance" xmlns:pc="http://schemas.microsoft.com/office/infopath/2007/PartnerControls">
-  <documentManagement>
-    <VSO_x0020_item_x0020_id xmlns="40262f94-9f35-4ac3-9a90-690165a166b7" xsi:nil="true"/>
-    <Assetid_x0020_ xmlns="40262f94-9f35-4ac3-9a90-690165a166b7" xsi:nil="true"/>
-    <Item_x0020_Details xmlns="40262f94-9f35-4ac3-9a90-690165a166b7" xsi:nil="true"/>
-    <Template_x0020_details xmlns="40262f94-9f35-4ac3-9a90-690165a166b7" xsi:nil="true"/>
-  </documentManagement>
-</p:properties>
-</file>
-
-<file path=customXml/item2.xml><?xml version="1.0" encoding="utf-8"?>
-<?mso-contentType ?>
-<FormTemplates xmlns="http://schemas.microsoft.com/sharepoint/v3/contenttype/forms">
-  <Display>DocumentLibraryForm</Display>
-  <Edit>DocumentLibraryForm</Edit>
-  <New>DocumentLibraryForm</New>
-</FormTemplates>
-</file>
-
-<file path=customXml/item3.xml><?xml version="1.0" encoding="utf-8"?>
 <ct:contentTypeSchema xmlns:ct="http://schemas.microsoft.com/office/2006/metadata/contentType" xmlns:ma="http://schemas.microsoft.com/office/2006/metadata/properties/metaAttributes" ct:_="" ma:_="" ma:contentTypeName="Document" ma:contentTypeID="0x010100AA3F7D94069FF64A86F7DFF56D60E3BE" ma:contentTypeVersion="6" ma:contentTypeDescription="Create a new document." ma:contentTypeScope="" ma:versionID="c32302c77d4085ecf495bdddb7f5e889">
   <xsd:schema xmlns:xsd="http://www.w3.org/2001/XMLSchema" xmlns:xs="http://www.w3.org/2001/XMLSchema" xmlns:p="http://schemas.microsoft.com/office/2006/metadata/properties" xmlns:ns2="a4f35948-e619-41b3-aa29-22878b09cfd2" xmlns:ns3="40262f94-9f35-4ac3-9a90-690165a166b7" targetNamespace="http://schemas.microsoft.com/office/2006/metadata/properties" ma:root="true" ma:fieldsID="4ab5ae46be95f9d0be6107e8200be7a2" ns2:_="" ns3:_="">
     <xsd:import namespace="a4f35948-e619-41b3-aa29-22878b09cfd2"/>
@@ -11843,7 +11738,46 @@
 </ct:contentTypeSchema>
 </file>
 
+<file path=customXml/item2.xml><?xml version="1.0" encoding="utf-8"?>
+<p:properties xmlns:p="http://schemas.microsoft.com/office/2006/metadata/properties" xmlns:xsi="http://www.w3.org/2001/XMLSchema-instance" xmlns:pc="http://schemas.microsoft.com/office/infopath/2007/PartnerControls">
+  <documentManagement>
+    <VSO_x0020_item_x0020_id xmlns="40262f94-9f35-4ac3-9a90-690165a166b7" xsi:nil="true"/>
+    <Assetid_x0020_ xmlns="40262f94-9f35-4ac3-9a90-690165a166b7" xsi:nil="true"/>
+    <Item_x0020_Details xmlns="40262f94-9f35-4ac3-9a90-690165a166b7" xsi:nil="true"/>
+    <Template_x0020_details xmlns="40262f94-9f35-4ac3-9a90-690165a166b7" xsi:nil="true"/>
+  </documentManagement>
+</p:properties>
+</file>
+
+<file path=customXml/item3.xml><?xml version="1.0" encoding="utf-8"?>
+<?mso-contentType ?>
+<FormTemplates xmlns="http://schemas.microsoft.com/sharepoint/v3/contenttype/forms">
+  <Display>DocumentLibraryForm</Display>
+  <Edit>DocumentLibraryForm</Edit>
+  <New>DocumentLibraryForm</New>
+</FormTemplates>
+</file>
+
 <file path=customXml/itemProps1.xml><?xml version="1.0" encoding="utf-8"?>
+<ds:datastoreItem xmlns:ds="http://schemas.openxmlformats.org/officeDocument/2006/customXml" ds:itemID="{2961EA76-1630-4788-A629-8FDAFC920575}">
+  <ds:schemaRefs>
+    <ds:schemaRef ds:uri="http://schemas.microsoft.com/office/2006/metadata/contentType"/>
+    <ds:schemaRef ds:uri="http://schemas.microsoft.com/office/2006/metadata/properties/metaAttributes"/>
+    <ds:schemaRef ds:uri="http://www.w3.org/2001/XMLSchema"/>
+    <ds:schemaRef ds:uri="http://schemas.microsoft.com/office/2006/metadata/properties"/>
+    <ds:schemaRef ds:uri="a4f35948-e619-41b3-aa29-22878b09cfd2"/>
+    <ds:schemaRef ds:uri="40262f94-9f35-4ac3-9a90-690165a166b7"/>
+    <ds:schemaRef ds:uri="http://schemas.microsoft.com/office/2006/documentManagement/types"/>
+    <ds:schemaRef ds:uri="http://schemas.microsoft.com/office/infopath/2007/PartnerControls"/>
+    <ds:schemaRef ds:uri="http://schemas.openxmlformats.org/package/2006/metadata/core-properties"/>
+    <ds:schemaRef ds:uri="http://purl.org/dc/elements/1.1/"/>
+    <ds:schemaRef ds:uri="http://purl.org/dc/terms/"/>
+    <ds:schemaRef ds:uri="http://schemas.microsoft.com/internal/obd"/>
+  </ds:schemaRefs>
+</ds:datastoreItem>
+</file>
+
+<file path=customXml/itemProps2.xml><?xml version="1.0" encoding="utf-8"?>
 <ds:datastoreItem xmlns:ds="http://schemas.openxmlformats.org/officeDocument/2006/customXml" ds:itemID="{85A16170-AED4-43FB-90C7-1F1653EBFACC}">
   <ds:schemaRefs>
     <ds:schemaRef ds:uri="http://schemas.openxmlformats.org/package/2006/metadata/core-properties"/>
@@ -11860,29 +11794,10 @@
 </ds:datastoreItem>
 </file>
 
-<file path=customXml/itemProps2.xml><?xml version="1.0" encoding="utf-8"?>
+<file path=customXml/itemProps3.xml><?xml version="1.0" encoding="utf-8"?>
 <ds:datastoreItem xmlns:ds="http://schemas.openxmlformats.org/officeDocument/2006/customXml" ds:itemID="{31C05A15-2C36-4B2C-9ED7-7313D59409A3}">
   <ds:schemaRefs>
     <ds:schemaRef ds:uri="http://schemas.microsoft.com/sharepoint/v3/contenttype/forms"/>
   </ds:schemaRefs>
 </ds:datastoreItem>
-</file>
-
-<file path=customXml/itemProps3.xml><?xml version="1.0" encoding="utf-8"?>
-<ds:datastoreItem xmlns:ds="http://schemas.openxmlformats.org/officeDocument/2006/customXml" ds:itemID="{2961EA76-1630-4788-A629-8FDAFC920575}">
-  <ds:schemaRefs>
-    <ds:schemaRef ds:uri="http://schemas.microsoft.com/office/2006/metadata/contentType"/>
-    <ds:schemaRef ds:uri="http://schemas.microsoft.com/office/2006/metadata/properties/metaAttributes"/>
-    <ds:schemaRef ds:uri="http://www.w3.org/2001/XMLSchema"/>
-    <ds:schemaRef ds:uri="http://schemas.microsoft.com/office/2006/metadata/properties"/>
-    <ds:schemaRef ds:uri="a4f35948-e619-41b3-aa29-22878b09cfd2"/>
-    <ds:schemaRef ds:uri="40262f94-9f35-4ac3-9a90-690165a166b7"/>
-    <ds:schemaRef ds:uri="http://schemas.microsoft.com/office/2006/documentManagement/types"/>
-    <ds:schemaRef ds:uri="http://schemas.microsoft.com/office/infopath/2007/PartnerControls"/>
-    <ds:schemaRef ds:uri="http://schemas.openxmlformats.org/package/2006/metadata/core-properties"/>
-    <ds:schemaRef ds:uri="http://purl.org/dc/elements/1.1/"/>
-    <ds:schemaRef ds:uri="http://purl.org/dc/terms/"/>
-    <ds:schemaRef ds:uri="http://schemas.microsoft.com/internal/obd"/>
-  </ds:schemaRefs>
-</ds:datastoreItem>
 </file>
</xml_diff>